<commit_message>
host and guest connection
</commit_message>
<xml_diff>
--- a/images.pptx
+++ b/images.pptx
@@ -9465,8 +9465,8 @@
         </p:blipFill>
         <p:spPr>
           <a:xfrm>
-            <a:off x="9431338" y="2657550"/>
-            <a:ext cx="1638975" cy="1023937"/>
+            <a:off x="9431338" y="3167137"/>
+            <a:ext cx="823299" cy="514350"/>
           </a:xfrm>
           <a:prstGeom prst="rect">
             <a:avLst/>
@@ -9495,8 +9495,158 @@
         </p:blipFill>
         <p:spPr>
           <a:xfrm>
-            <a:off x="1771650" y="2121850"/>
-            <a:ext cx="1662630" cy="1047592"/>
+            <a:off x="1771650" y="2643208"/>
+            <a:ext cx="835183" cy="526233"/>
+          </a:xfrm>
+          <a:prstGeom prst="rect">
+            <a:avLst/>
+          </a:prstGeom>
+        </p:spPr>
+      </p:pic>
+      <p:pic>
+        <p:nvPicPr>
+          <p:cNvPr id="49" name="Picture 48" descr="A picture containing pallette&#10;&#10;Description automatically generated">
+            <a:extLst>
+              <a:ext uri="{FF2B5EF4-FFF2-40B4-BE49-F238E27FC236}">
+                <a16:creationId xmlns:a16="http://schemas.microsoft.com/office/drawing/2014/main" id="{31222C9C-9FE4-1B4E-8CCC-3F4671EA21BB}"/>
+              </a:ext>
+            </a:extLst>
+          </p:cNvPr>
+          <p:cNvPicPr>
+            <a:picLocks noChangeAspect="1"/>
+          </p:cNvPicPr>
+          <p:nvPr/>
+        </p:nvPicPr>
+        <p:blipFill>
+          <a:blip r:embed="rId4"/>
+          <a:stretch>
+            <a:fillRect/>
+          </a:stretch>
+        </p:blipFill>
+        <p:spPr>
+          <a:xfrm flipH="1">
+            <a:off x="1121687" y="2902861"/>
+            <a:ext cx="421363" cy="421363"/>
+          </a:xfrm>
+          <a:prstGeom prst="rect">
+            <a:avLst/>
+          </a:prstGeom>
+        </p:spPr>
+      </p:pic>
+      <p:pic>
+        <p:nvPicPr>
+          <p:cNvPr id="50" name="Picture 49" descr="A picture containing pallette&#10;&#10;Description automatically generated">
+            <a:extLst>
+              <a:ext uri="{FF2B5EF4-FFF2-40B4-BE49-F238E27FC236}">
+                <a16:creationId xmlns:a16="http://schemas.microsoft.com/office/drawing/2014/main" id="{B7D4398A-7309-794E-B297-1E1171A15BF7}"/>
+              </a:ext>
+            </a:extLst>
+          </p:cNvPr>
+          <p:cNvPicPr>
+            <a:picLocks noChangeAspect="1"/>
+          </p:cNvPicPr>
+          <p:nvPr/>
+        </p:nvPicPr>
+        <p:blipFill>
+          <a:blip r:embed="rId4"/>
+          <a:stretch>
+            <a:fillRect/>
+          </a:stretch>
+        </p:blipFill>
+        <p:spPr>
+          <a:xfrm flipH="1">
+            <a:off x="700324" y="3324224"/>
+            <a:ext cx="421363" cy="421363"/>
+          </a:xfrm>
+          <a:prstGeom prst="rect">
+            <a:avLst/>
+          </a:prstGeom>
+        </p:spPr>
+      </p:pic>
+      <p:pic>
+        <p:nvPicPr>
+          <p:cNvPr id="51" name="Picture 50" descr="A picture containing pallette&#10;&#10;Description automatically generated">
+            <a:extLst>
+              <a:ext uri="{FF2B5EF4-FFF2-40B4-BE49-F238E27FC236}">
+                <a16:creationId xmlns:a16="http://schemas.microsoft.com/office/drawing/2014/main" id="{92F71D86-81D6-B44D-A662-07AB0029566A}"/>
+              </a:ext>
+            </a:extLst>
+          </p:cNvPr>
+          <p:cNvPicPr>
+            <a:picLocks noChangeAspect="1"/>
+          </p:cNvPicPr>
+          <p:nvPr/>
+        </p:nvPicPr>
+        <p:blipFill>
+          <a:blip r:embed="rId4"/>
+          <a:stretch>
+            <a:fillRect/>
+          </a:stretch>
+        </p:blipFill>
+        <p:spPr>
+          <a:xfrm flipH="1">
+            <a:off x="511191" y="3956268"/>
+            <a:ext cx="421363" cy="421363"/>
+          </a:xfrm>
+          <a:prstGeom prst="rect">
+            <a:avLst/>
+          </a:prstGeom>
+        </p:spPr>
+      </p:pic>
+      <p:pic>
+        <p:nvPicPr>
+          <p:cNvPr id="52" name="Picture 51" descr="A picture containing pallette&#10;&#10;Description automatically generated">
+            <a:extLst>
+              <a:ext uri="{FF2B5EF4-FFF2-40B4-BE49-F238E27FC236}">
+                <a16:creationId xmlns:a16="http://schemas.microsoft.com/office/drawing/2014/main" id="{2C7FC8DE-83B0-084F-B2A4-BAF11EF366CF}"/>
+              </a:ext>
+            </a:extLst>
+          </p:cNvPr>
+          <p:cNvPicPr>
+            <a:picLocks noChangeAspect="1"/>
+          </p:cNvPicPr>
+          <p:nvPr/>
+        </p:nvPicPr>
+        <p:blipFill>
+          <a:blip r:embed="rId4"/>
+          <a:stretch>
+            <a:fillRect/>
+          </a:stretch>
+        </p:blipFill>
+        <p:spPr>
+          <a:xfrm flipH="1">
+            <a:off x="425701" y="4454724"/>
+            <a:ext cx="421363" cy="421363"/>
+          </a:xfrm>
+          <a:prstGeom prst="rect">
+            <a:avLst/>
+          </a:prstGeom>
+        </p:spPr>
+      </p:pic>
+      <p:pic>
+        <p:nvPicPr>
+          <p:cNvPr id="53" name="Picture 52" descr="A picture containing clock, drawing&#10;&#10;Description automatically generated">
+            <a:extLst>
+              <a:ext uri="{FF2B5EF4-FFF2-40B4-BE49-F238E27FC236}">
+                <a16:creationId xmlns:a16="http://schemas.microsoft.com/office/drawing/2014/main" id="{CD3DEB74-CCC0-7449-9020-E967C4D315A3}"/>
+              </a:ext>
+            </a:extLst>
+          </p:cNvPr>
+          <p:cNvPicPr>
+            <a:picLocks noChangeAspect="1"/>
+          </p:cNvPicPr>
+          <p:nvPr/>
+        </p:nvPicPr>
+        <p:blipFill>
+          <a:blip r:embed="rId3"/>
+          <a:stretch>
+            <a:fillRect/>
+          </a:stretch>
+        </p:blipFill>
+        <p:spPr>
+          <a:xfrm>
+            <a:off x="2066925" y="3337378"/>
+            <a:ext cx="835183" cy="526233"/>
           </a:xfrm>
           <a:prstGeom prst="rect">
             <a:avLst/>

</xml_diff>